<commit_message>
Updated dev docs and most of the diagrams
Updated the diagrams mostly. Updated the names of some diagrams
</commit_message>
<xml_diff>
--- a/docs/diagrams/HighLevelSequenceDiagrams.pptx
+++ b/docs/diagrams/HighLevelSequenceDiagrams.pptx
@@ -107,6 +107,22 @@
       </a:defRPr>
     </a:lvl9pPr>
   </p:defaultTextStyle>
+  <p:extLst>
+    <p:ext uri="{EFAFB233-063F-42B5-8137-9DF3F51BA10A}">
+      <p15:sldGuideLst xmlns:p15="http://schemas.microsoft.com/office/powerpoint/2012/main">
+        <p15:guide id="1" orient="horz" pos="1488">
+          <p15:clr>
+            <a:srgbClr val="A4A3A4"/>
+          </p15:clr>
+        </p15:guide>
+        <p15:guide id="2" pos="2880">
+          <p15:clr>
+            <a:srgbClr val="A4A3A4"/>
+          </p15:clr>
+        </p15:guide>
+      </p15:sldGuideLst>
+    </p:ext>
+  </p:extLst>
 </p:presentation>
 </file>
 
@@ -192,7 +208,7 @@
           <a:p>
             <a:fld id="{F5CC4B3F-88C1-4FFA-B1B6-F41C21DC6924}" type="datetimeFigureOut">
               <a:rPr lang="en-US" smtClean="0"/>
-              <a:t>10/16/2016</a:t>
+              <a:t>10/22/2018</a:t>
             </a:fld>
             <a:endParaRPr lang="en-US"/>
           </a:p>
@@ -256,38 +272,37 @@
           <a:p>
             <a:pPr lvl="0"/>
             <a:r>
-              <a:rPr lang="en-US" smtClean="0"/>
+              <a:rPr lang="en-US"/>
               <a:t>Click to edit Master text styles</a:t>
             </a:r>
           </a:p>
           <a:p>
             <a:pPr lvl="1"/>
             <a:r>
-              <a:rPr lang="en-US" smtClean="0"/>
+              <a:rPr lang="en-US"/>
               <a:t>Second level</a:t>
             </a:r>
           </a:p>
           <a:p>
             <a:pPr lvl="2"/>
             <a:r>
-              <a:rPr lang="en-US" smtClean="0"/>
+              <a:rPr lang="en-US"/>
               <a:t>Third level</a:t>
             </a:r>
           </a:p>
           <a:p>
             <a:pPr lvl="3"/>
             <a:r>
-              <a:rPr lang="en-US" smtClean="0"/>
+              <a:rPr lang="en-US"/>
               <a:t>Fourth level</a:t>
             </a:r>
           </a:p>
           <a:p>
             <a:pPr lvl="4"/>
             <a:r>
-              <a:rPr lang="en-US" smtClean="0"/>
+              <a:rPr lang="en-US"/>
               <a:t>Fifth level</a:t>
             </a:r>
-            <a:endParaRPr lang="en-US"/>
           </a:p>
         </p:txBody>
       </p:sp>
@@ -498,10 +513,9 @@
           <a:lstStyle/>
           <a:p>
             <a:r>
-              <a:rPr lang="en-US" smtClean="0"/>
+              <a:rPr lang="en-US"/>
               <a:t>Click to edit Master title style</a:t>
             </a:r>
-            <a:endParaRPr lang="en-US"/>
           </a:p>
         </p:txBody>
       </p:sp>
@@ -617,10 +631,9 @@
           </a:lstStyle>
           <a:p>
             <a:r>
-              <a:rPr lang="en-US" smtClean="0"/>
+              <a:rPr lang="en-US"/>
               <a:t>Click to edit Master subtitle style</a:t>
             </a:r>
-            <a:endParaRPr lang="en-US"/>
           </a:p>
         </p:txBody>
       </p:sp>
@@ -641,7 +654,7 @@
           <a:p>
             <a:fld id="{78C97017-6FC3-485B-9764-EAC9E56C1D49}" type="datetimeFigureOut">
               <a:rPr lang="en-US" smtClean="0"/>
-              <a:t>10/16/2016</a:t>
+              <a:t>10/22/2018</a:t>
             </a:fld>
             <a:endParaRPr lang="en-US"/>
           </a:p>
@@ -735,10 +748,9 @@
           <a:lstStyle/>
           <a:p>
             <a:r>
-              <a:rPr lang="en-US" smtClean="0"/>
+              <a:rPr lang="en-US"/>
               <a:t>Click to edit Master title style</a:t>
             </a:r>
-            <a:endParaRPr lang="en-US"/>
           </a:p>
         </p:txBody>
       </p:sp>
@@ -759,38 +771,37 @@
           <a:p>
             <a:pPr lvl="0"/>
             <a:r>
-              <a:rPr lang="en-US" smtClean="0"/>
+              <a:rPr lang="en-US"/>
               <a:t>Click to edit Master text styles</a:t>
             </a:r>
           </a:p>
           <a:p>
             <a:pPr lvl="1"/>
             <a:r>
-              <a:rPr lang="en-US" smtClean="0"/>
+              <a:rPr lang="en-US"/>
               <a:t>Second level</a:t>
             </a:r>
           </a:p>
           <a:p>
             <a:pPr lvl="2"/>
             <a:r>
-              <a:rPr lang="en-US" smtClean="0"/>
+              <a:rPr lang="en-US"/>
               <a:t>Third level</a:t>
             </a:r>
           </a:p>
           <a:p>
             <a:pPr lvl="3"/>
             <a:r>
-              <a:rPr lang="en-US" smtClean="0"/>
+              <a:rPr lang="en-US"/>
               <a:t>Fourth level</a:t>
             </a:r>
           </a:p>
           <a:p>
             <a:pPr lvl="4"/>
             <a:r>
-              <a:rPr lang="en-US" smtClean="0"/>
+              <a:rPr lang="en-US"/>
               <a:t>Fifth level</a:t>
             </a:r>
-            <a:endParaRPr lang="en-US"/>
           </a:p>
         </p:txBody>
       </p:sp>
@@ -811,7 +822,7 @@
           <a:p>
             <a:fld id="{78C97017-6FC3-485B-9764-EAC9E56C1D49}" type="datetimeFigureOut">
               <a:rPr lang="en-US" smtClean="0"/>
-              <a:t>10/16/2016</a:t>
+              <a:t>10/22/2018</a:t>
             </a:fld>
             <a:endParaRPr lang="en-US"/>
           </a:p>
@@ -910,10 +921,9 @@
           <a:lstStyle/>
           <a:p>
             <a:r>
-              <a:rPr lang="en-US" smtClean="0"/>
+              <a:rPr lang="en-US"/>
               <a:t>Click to edit Master title style</a:t>
             </a:r>
-            <a:endParaRPr lang="en-US"/>
           </a:p>
         </p:txBody>
       </p:sp>
@@ -939,38 +949,37 @@
           <a:p>
             <a:pPr lvl="0"/>
             <a:r>
-              <a:rPr lang="en-US" smtClean="0"/>
+              <a:rPr lang="en-US"/>
               <a:t>Click to edit Master text styles</a:t>
             </a:r>
           </a:p>
           <a:p>
             <a:pPr lvl="1"/>
             <a:r>
-              <a:rPr lang="en-US" smtClean="0"/>
+              <a:rPr lang="en-US"/>
               <a:t>Second level</a:t>
             </a:r>
           </a:p>
           <a:p>
             <a:pPr lvl="2"/>
             <a:r>
-              <a:rPr lang="en-US" smtClean="0"/>
+              <a:rPr lang="en-US"/>
               <a:t>Third level</a:t>
             </a:r>
           </a:p>
           <a:p>
             <a:pPr lvl="3"/>
             <a:r>
-              <a:rPr lang="en-US" smtClean="0"/>
+              <a:rPr lang="en-US"/>
               <a:t>Fourth level</a:t>
             </a:r>
           </a:p>
           <a:p>
             <a:pPr lvl="4"/>
             <a:r>
-              <a:rPr lang="en-US" smtClean="0"/>
+              <a:rPr lang="en-US"/>
               <a:t>Fifth level</a:t>
             </a:r>
-            <a:endParaRPr lang="en-US"/>
           </a:p>
         </p:txBody>
       </p:sp>
@@ -991,7 +1000,7 @@
           <a:p>
             <a:fld id="{78C97017-6FC3-485B-9764-EAC9E56C1D49}" type="datetimeFigureOut">
               <a:rPr lang="en-US" smtClean="0"/>
-              <a:t>10/16/2016</a:t>
+              <a:t>10/22/2018</a:t>
             </a:fld>
             <a:endParaRPr lang="en-US"/>
           </a:p>
@@ -1085,10 +1094,9 @@
           <a:lstStyle/>
           <a:p>
             <a:r>
-              <a:rPr lang="en-US" smtClean="0"/>
+              <a:rPr lang="en-US"/>
               <a:t>Click to edit Master title style</a:t>
             </a:r>
-            <a:endParaRPr lang="en-US"/>
           </a:p>
         </p:txBody>
       </p:sp>
@@ -1109,38 +1117,37 @@
           <a:p>
             <a:pPr lvl="0"/>
             <a:r>
-              <a:rPr lang="en-US" smtClean="0"/>
+              <a:rPr lang="en-US"/>
               <a:t>Click to edit Master text styles</a:t>
             </a:r>
           </a:p>
           <a:p>
             <a:pPr lvl="1"/>
             <a:r>
-              <a:rPr lang="en-US" smtClean="0"/>
+              <a:rPr lang="en-US"/>
               <a:t>Second level</a:t>
             </a:r>
           </a:p>
           <a:p>
             <a:pPr lvl="2"/>
             <a:r>
-              <a:rPr lang="en-US" smtClean="0"/>
+              <a:rPr lang="en-US"/>
               <a:t>Third level</a:t>
             </a:r>
           </a:p>
           <a:p>
             <a:pPr lvl="3"/>
             <a:r>
-              <a:rPr lang="en-US" smtClean="0"/>
+              <a:rPr lang="en-US"/>
               <a:t>Fourth level</a:t>
             </a:r>
           </a:p>
           <a:p>
             <a:pPr lvl="4"/>
             <a:r>
-              <a:rPr lang="en-US" smtClean="0"/>
+              <a:rPr lang="en-US"/>
               <a:t>Fifth level</a:t>
             </a:r>
-            <a:endParaRPr lang="en-US"/>
           </a:p>
         </p:txBody>
       </p:sp>
@@ -1161,7 +1168,7 @@
           <a:p>
             <a:fld id="{78C97017-6FC3-485B-9764-EAC9E56C1D49}" type="datetimeFigureOut">
               <a:rPr lang="en-US" smtClean="0"/>
-              <a:t>10/16/2016</a:t>
+              <a:t>10/22/2018</a:t>
             </a:fld>
             <a:endParaRPr lang="en-US"/>
           </a:p>
@@ -1264,10 +1271,9 @@
           </a:lstStyle>
           <a:p>
             <a:r>
-              <a:rPr lang="en-US" smtClean="0"/>
+              <a:rPr lang="en-US"/>
               <a:t>Click to edit Master title style</a:t>
             </a:r>
-            <a:endParaRPr lang="en-US"/>
           </a:p>
         </p:txBody>
       </p:sp>
@@ -1384,7 +1390,7 @@
           <a:p>
             <a:pPr lvl="0"/>
             <a:r>
-              <a:rPr lang="en-US" smtClean="0"/>
+              <a:rPr lang="en-US"/>
               <a:t>Click to edit Master text styles</a:t>
             </a:r>
           </a:p>
@@ -1407,7 +1413,7 @@
           <a:p>
             <a:fld id="{78C97017-6FC3-485B-9764-EAC9E56C1D49}" type="datetimeFigureOut">
               <a:rPr lang="en-US" smtClean="0"/>
-              <a:t>10/16/2016</a:t>
+              <a:t>10/22/2018</a:t>
             </a:fld>
             <a:endParaRPr lang="en-US"/>
           </a:p>
@@ -1501,10 +1507,9 @@
           <a:lstStyle/>
           <a:p>
             <a:r>
-              <a:rPr lang="en-US" smtClean="0"/>
+              <a:rPr lang="en-US"/>
               <a:t>Click to edit Master title style</a:t>
             </a:r>
-            <a:endParaRPr lang="en-US"/>
           </a:p>
         </p:txBody>
       </p:sp>
@@ -1558,38 +1563,37 @@
           <a:p>
             <a:pPr lvl="0"/>
             <a:r>
-              <a:rPr lang="en-US" smtClean="0"/>
+              <a:rPr lang="en-US"/>
               <a:t>Click to edit Master text styles</a:t>
             </a:r>
           </a:p>
           <a:p>
             <a:pPr lvl="1"/>
             <a:r>
-              <a:rPr lang="en-US" smtClean="0"/>
+              <a:rPr lang="en-US"/>
               <a:t>Second level</a:t>
             </a:r>
           </a:p>
           <a:p>
             <a:pPr lvl="2"/>
             <a:r>
-              <a:rPr lang="en-US" smtClean="0"/>
+              <a:rPr lang="en-US"/>
               <a:t>Third level</a:t>
             </a:r>
           </a:p>
           <a:p>
             <a:pPr lvl="3"/>
             <a:r>
-              <a:rPr lang="en-US" smtClean="0"/>
+              <a:rPr lang="en-US"/>
               <a:t>Fourth level</a:t>
             </a:r>
           </a:p>
           <a:p>
             <a:pPr lvl="4"/>
             <a:r>
-              <a:rPr lang="en-US" smtClean="0"/>
+              <a:rPr lang="en-US"/>
               <a:t>Fifth level</a:t>
             </a:r>
-            <a:endParaRPr lang="en-US"/>
           </a:p>
         </p:txBody>
       </p:sp>
@@ -1643,38 +1647,37 @@
           <a:p>
             <a:pPr lvl="0"/>
             <a:r>
-              <a:rPr lang="en-US" smtClean="0"/>
+              <a:rPr lang="en-US"/>
               <a:t>Click to edit Master text styles</a:t>
             </a:r>
           </a:p>
           <a:p>
             <a:pPr lvl="1"/>
             <a:r>
-              <a:rPr lang="en-US" smtClean="0"/>
+              <a:rPr lang="en-US"/>
               <a:t>Second level</a:t>
             </a:r>
           </a:p>
           <a:p>
             <a:pPr lvl="2"/>
             <a:r>
-              <a:rPr lang="en-US" smtClean="0"/>
+              <a:rPr lang="en-US"/>
               <a:t>Third level</a:t>
             </a:r>
           </a:p>
           <a:p>
             <a:pPr lvl="3"/>
             <a:r>
-              <a:rPr lang="en-US" smtClean="0"/>
+              <a:rPr lang="en-US"/>
               <a:t>Fourth level</a:t>
             </a:r>
           </a:p>
           <a:p>
             <a:pPr lvl="4"/>
             <a:r>
-              <a:rPr lang="en-US" smtClean="0"/>
+              <a:rPr lang="en-US"/>
               <a:t>Fifth level</a:t>
             </a:r>
-            <a:endParaRPr lang="en-US"/>
           </a:p>
         </p:txBody>
       </p:sp>
@@ -1695,7 +1698,7 @@
           <a:p>
             <a:fld id="{78C97017-6FC3-485B-9764-EAC9E56C1D49}" type="datetimeFigureOut">
               <a:rPr lang="en-US" smtClean="0"/>
-              <a:t>10/16/2016</a:t>
+              <a:t>10/22/2018</a:t>
             </a:fld>
             <a:endParaRPr lang="en-US"/>
           </a:p>
@@ -1793,10 +1796,9 @@
           </a:lstStyle>
           <a:p>
             <a:r>
-              <a:rPr lang="en-US" smtClean="0"/>
+              <a:rPr lang="en-US"/>
               <a:t>Click to edit Master title style</a:t>
             </a:r>
-            <a:endParaRPr lang="en-US"/>
           </a:p>
         </p:txBody>
       </p:sp>
@@ -1859,7 +1861,7 @@
           <a:p>
             <a:pPr lvl="0"/>
             <a:r>
-              <a:rPr lang="en-US" smtClean="0"/>
+              <a:rPr lang="en-US"/>
               <a:t>Click to edit Master text styles</a:t>
             </a:r>
           </a:p>
@@ -1915,38 +1917,37 @@
           <a:p>
             <a:pPr lvl="0"/>
             <a:r>
-              <a:rPr lang="en-US" smtClean="0"/>
+              <a:rPr lang="en-US"/>
               <a:t>Click to edit Master text styles</a:t>
             </a:r>
           </a:p>
           <a:p>
             <a:pPr lvl="1"/>
             <a:r>
-              <a:rPr lang="en-US" smtClean="0"/>
+              <a:rPr lang="en-US"/>
               <a:t>Second level</a:t>
             </a:r>
           </a:p>
           <a:p>
             <a:pPr lvl="2"/>
             <a:r>
-              <a:rPr lang="en-US" smtClean="0"/>
+              <a:rPr lang="en-US"/>
               <a:t>Third level</a:t>
             </a:r>
           </a:p>
           <a:p>
             <a:pPr lvl="3"/>
             <a:r>
-              <a:rPr lang="en-US" smtClean="0"/>
+              <a:rPr lang="en-US"/>
               <a:t>Fourth level</a:t>
             </a:r>
           </a:p>
           <a:p>
             <a:pPr lvl="4"/>
             <a:r>
-              <a:rPr lang="en-US" smtClean="0"/>
+              <a:rPr lang="en-US"/>
               <a:t>Fifth level</a:t>
             </a:r>
-            <a:endParaRPr lang="en-US"/>
           </a:p>
         </p:txBody>
       </p:sp>
@@ -2009,7 +2010,7 @@
           <a:p>
             <a:pPr lvl="0"/>
             <a:r>
-              <a:rPr lang="en-US" smtClean="0"/>
+              <a:rPr lang="en-US"/>
               <a:t>Click to edit Master text styles</a:t>
             </a:r>
           </a:p>
@@ -2065,38 +2066,37 @@
           <a:p>
             <a:pPr lvl="0"/>
             <a:r>
-              <a:rPr lang="en-US" smtClean="0"/>
+              <a:rPr lang="en-US"/>
               <a:t>Click to edit Master text styles</a:t>
             </a:r>
           </a:p>
           <a:p>
             <a:pPr lvl="1"/>
             <a:r>
-              <a:rPr lang="en-US" smtClean="0"/>
+              <a:rPr lang="en-US"/>
               <a:t>Second level</a:t>
             </a:r>
           </a:p>
           <a:p>
             <a:pPr lvl="2"/>
             <a:r>
-              <a:rPr lang="en-US" smtClean="0"/>
+              <a:rPr lang="en-US"/>
               <a:t>Third level</a:t>
             </a:r>
           </a:p>
           <a:p>
             <a:pPr lvl="3"/>
             <a:r>
-              <a:rPr lang="en-US" smtClean="0"/>
+              <a:rPr lang="en-US"/>
               <a:t>Fourth level</a:t>
             </a:r>
           </a:p>
           <a:p>
             <a:pPr lvl="4"/>
             <a:r>
-              <a:rPr lang="en-US" smtClean="0"/>
+              <a:rPr lang="en-US"/>
               <a:t>Fifth level</a:t>
             </a:r>
-            <a:endParaRPr lang="en-US"/>
           </a:p>
         </p:txBody>
       </p:sp>
@@ -2117,7 +2117,7 @@
           <a:p>
             <a:fld id="{78C97017-6FC3-485B-9764-EAC9E56C1D49}" type="datetimeFigureOut">
               <a:rPr lang="en-US" smtClean="0"/>
-              <a:t>10/16/2016</a:t>
+              <a:t>10/22/2018</a:t>
             </a:fld>
             <a:endParaRPr lang="en-US"/>
           </a:p>
@@ -2211,10 +2211,9 @@
           <a:lstStyle/>
           <a:p>
             <a:r>
-              <a:rPr lang="en-US" smtClean="0"/>
+              <a:rPr lang="en-US"/>
               <a:t>Click to edit Master title style</a:t>
             </a:r>
-            <a:endParaRPr lang="en-US"/>
           </a:p>
         </p:txBody>
       </p:sp>
@@ -2235,7 +2234,7 @@
           <a:p>
             <a:fld id="{78C97017-6FC3-485B-9764-EAC9E56C1D49}" type="datetimeFigureOut">
               <a:rPr lang="en-US" smtClean="0"/>
-              <a:t>10/16/2016</a:t>
+              <a:t>10/22/2018</a:t>
             </a:fld>
             <a:endParaRPr lang="en-US"/>
           </a:p>
@@ -2330,7 +2329,7 @@
           <a:p>
             <a:fld id="{78C97017-6FC3-485B-9764-EAC9E56C1D49}" type="datetimeFigureOut">
               <a:rPr lang="en-US" smtClean="0"/>
-              <a:t>10/16/2016</a:t>
+              <a:t>10/22/2018</a:t>
             </a:fld>
             <a:endParaRPr lang="en-US"/>
           </a:p>
@@ -2433,10 +2432,9 @@
           </a:lstStyle>
           <a:p>
             <a:r>
-              <a:rPr lang="en-US" smtClean="0"/>
+              <a:rPr lang="en-US"/>
               <a:t>Click to edit Master title style</a:t>
             </a:r>
-            <a:endParaRPr lang="en-US"/>
           </a:p>
         </p:txBody>
       </p:sp>
@@ -2490,38 +2488,37 @@
           <a:p>
             <a:pPr lvl="0"/>
             <a:r>
-              <a:rPr lang="en-US" smtClean="0"/>
+              <a:rPr lang="en-US"/>
               <a:t>Click to edit Master text styles</a:t>
             </a:r>
           </a:p>
           <a:p>
             <a:pPr lvl="1"/>
             <a:r>
-              <a:rPr lang="en-US" smtClean="0"/>
+              <a:rPr lang="en-US"/>
               <a:t>Second level</a:t>
             </a:r>
           </a:p>
           <a:p>
             <a:pPr lvl="2"/>
             <a:r>
-              <a:rPr lang="en-US" smtClean="0"/>
+              <a:rPr lang="en-US"/>
               <a:t>Third level</a:t>
             </a:r>
           </a:p>
           <a:p>
             <a:pPr lvl="3"/>
             <a:r>
-              <a:rPr lang="en-US" smtClean="0"/>
+              <a:rPr lang="en-US"/>
               <a:t>Fourth level</a:t>
             </a:r>
           </a:p>
           <a:p>
             <a:pPr lvl="4"/>
             <a:r>
-              <a:rPr lang="en-US" smtClean="0"/>
+              <a:rPr lang="en-US"/>
               <a:t>Fifth level</a:t>
             </a:r>
-            <a:endParaRPr lang="en-US"/>
           </a:p>
         </p:txBody>
       </p:sp>
@@ -2584,7 +2581,7 @@
           <a:p>
             <a:pPr lvl="0"/>
             <a:r>
-              <a:rPr lang="en-US" smtClean="0"/>
+              <a:rPr lang="en-US"/>
               <a:t>Click to edit Master text styles</a:t>
             </a:r>
           </a:p>
@@ -2607,7 +2604,7 @@
           <a:p>
             <a:fld id="{78C97017-6FC3-485B-9764-EAC9E56C1D49}" type="datetimeFigureOut">
               <a:rPr lang="en-US" smtClean="0"/>
-              <a:t>10/16/2016</a:t>
+              <a:t>10/22/2018</a:t>
             </a:fld>
             <a:endParaRPr lang="en-US"/>
           </a:p>
@@ -2710,10 +2707,9 @@
           </a:lstStyle>
           <a:p>
             <a:r>
-              <a:rPr lang="en-US" smtClean="0"/>
+              <a:rPr lang="en-US"/>
               <a:t>Click to edit Master title style</a:t>
             </a:r>
-            <a:endParaRPr lang="en-US"/>
           </a:p>
         </p:txBody>
       </p:sp>
@@ -2837,7 +2833,7 @@
           <a:p>
             <a:pPr lvl="0"/>
             <a:r>
-              <a:rPr lang="en-US" smtClean="0"/>
+              <a:rPr lang="en-US"/>
               <a:t>Click to edit Master text styles</a:t>
             </a:r>
           </a:p>
@@ -2860,7 +2856,7 @@
           <a:p>
             <a:fld id="{78C97017-6FC3-485B-9764-EAC9E56C1D49}" type="datetimeFigureOut">
               <a:rPr lang="en-US" smtClean="0"/>
-              <a:t>10/16/2016</a:t>
+              <a:t>10/22/2018</a:t>
             </a:fld>
             <a:endParaRPr lang="en-US"/>
           </a:p>
@@ -2969,10 +2965,9 @@
           <a:lstStyle/>
           <a:p>
             <a:r>
-              <a:rPr lang="en-US" smtClean="0"/>
+              <a:rPr lang="en-US"/>
               <a:t>Click to edit Master title style</a:t>
             </a:r>
-            <a:endParaRPr lang="en-US"/>
           </a:p>
         </p:txBody>
       </p:sp>
@@ -3003,38 +2998,37 @@
           <a:p>
             <a:pPr lvl="0"/>
             <a:r>
-              <a:rPr lang="en-US" smtClean="0"/>
+              <a:rPr lang="en-US"/>
               <a:t>Click to edit Master text styles</a:t>
             </a:r>
           </a:p>
           <a:p>
             <a:pPr lvl="1"/>
             <a:r>
-              <a:rPr lang="en-US" smtClean="0"/>
+              <a:rPr lang="en-US"/>
               <a:t>Second level</a:t>
             </a:r>
           </a:p>
           <a:p>
             <a:pPr lvl="2"/>
             <a:r>
-              <a:rPr lang="en-US" smtClean="0"/>
+              <a:rPr lang="en-US"/>
               <a:t>Third level</a:t>
             </a:r>
           </a:p>
           <a:p>
             <a:pPr lvl="3"/>
             <a:r>
-              <a:rPr lang="en-US" smtClean="0"/>
+              <a:rPr lang="en-US"/>
               <a:t>Fourth level</a:t>
             </a:r>
           </a:p>
           <a:p>
             <a:pPr lvl="4"/>
             <a:r>
-              <a:rPr lang="en-US" smtClean="0"/>
+              <a:rPr lang="en-US"/>
               <a:t>Fifth level</a:t>
             </a:r>
-            <a:endParaRPr lang="en-US"/>
           </a:p>
         </p:txBody>
       </p:sp>
@@ -3073,7 +3067,7 @@
           <a:p>
             <a:fld id="{78C97017-6FC3-485B-9764-EAC9E56C1D49}" type="datetimeFigureOut">
               <a:rPr lang="en-US" smtClean="0"/>
-              <a:t>10/16/2016</a:t>
+              <a:t>10/22/2018</a:t>
             </a:fld>
             <a:endParaRPr lang="en-US"/>
           </a:p>
@@ -3492,7 +3486,7 @@
           <a:p>
             <a:pPr algn="ctr"/>
             <a:r>
-              <a:rPr lang="en-US" sz="1600" dirty="0" smtClean="0">
+              <a:rPr lang="en-US" sz="1600" dirty="0">
                 <a:solidFill>
                   <a:schemeClr val="bg1"/>
                 </a:solidFill>
@@ -3856,7 +3850,7 @@
           <a:p>
             <a:pPr algn="ctr"/>
             <a:r>
-              <a:rPr lang="en-US" sz="1600" dirty="0" smtClean="0">
+              <a:rPr lang="en-US" sz="1600" dirty="0">
                 <a:solidFill>
                   <a:schemeClr val="bg1"/>
                 </a:solidFill>
@@ -4003,7 +3997,7 @@
           <a:p>
             <a:pPr algn="ctr"/>
             <a:r>
-              <a:rPr lang="en-US" sz="1600" dirty="0" smtClean="0">
+              <a:rPr lang="en-US" sz="1600" dirty="0">
                 <a:solidFill>
                   <a:schemeClr val="bg1"/>
                 </a:solidFill>
@@ -4165,10 +4159,9 @@
           <a:lstStyle/>
           <a:p>
             <a:r>
-              <a:rPr lang="en-US" sz="1400" dirty="0" smtClean="0"/>
+              <a:rPr lang="en-US" sz="1400" dirty="0"/>
               <a:t>delete 1</a:t>
             </a:r>
-            <a:endParaRPr lang="en-US" sz="1400" dirty="0"/>
           </a:p>
         </p:txBody>
       </p:sp>
@@ -4231,18 +4224,13 @@
           <a:lstStyle/>
           <a:p>
             <a:r>
-              <a:rPr lang="en-US" sz="1400" dirty="0" smtClean="0">
+              <a:rPr lang="en-US" sz="1400" dirty="0">
                 <a:solidFill>
                   <a:srgbClr val="0070C0"/>
                 </a:solidFill>
               </a:rPr>
               <a:t>execute(“delete 1”)</a:t>
             </a:r>
-            <a:endParaRPr lang="en-US" sz="1400" dirty="0">
-              <a:solidFill>
-                <a:srgbClr val="0070C0"/>
-              </a:solidFill>
-            </a:endParaRPr>
           </a:p>
         </p:txBody>
       </p:sp>
@@ -4290,8 +4278,8 @@
         </p:nvSpPr>
         <p:spPr>
           <a:xfrm>
-            <a:off x="4299772" y="1542583"/>
-            <a:ext cx="1424846" cy="215444"/>
+            <a:off x="4173782" y="1542583"/>
+            <a:ext cx="1550836" cy="215444"/>
           </a:xfrm>
           <a:prstGeom prst="rect">
             <a:avLst/>
@@ -4305,26 +4293,21 @@
           <a:lstStyle/>
           <a:p>
             <a:r>
-              <a:rPr lang="en-US" sz="1400" dirty="0" err="1" smtClean="0">
+              <a:rPr lang="en-US" sz="1400" dirty="0" err="1">
                 <a:solidFill>
                   <a:srgbClr val="7030A0"/>
                 </a:solidFill>
               </a:rPr>
-              <a:t>deletePerson</a:t>
-            </a:r>
-            <a:r>
-              <a:rPr lang="en-US" sz="1400" dirty="0" smtClean="0">
+              <a:t>deleteDiveSession</a:t>
+            </a:r>
+            <a:r>
+              <a:rPr lang="en-US" sz="1400" dirty="0">
                 <a:solidFill>
                   <a:srgbClr val="7030A0"/>
                 </a:solidFill>
               </a:rPr>
               <a:t>(p)</a:t>
             </a:r>
-            <a:endParaRPr lang="en-US" sz="1400" dirty="0">
-              <a:solidFill>
-                <a:srgbClr val="7030A0"/>
-              </a:solidFill>
-            </a:endParaRPr>
           </a:p>
         </p:txBody>
       </p:sp>
@@ -4336,7 +4319,7 @@
         </p:nvSpPr>
         <p:spPr>
           <a:xfrm>
-            <a:off x="6074030" y="1687656"/>
+            <a:off x="6096000" y="1689556"/>
             <a:ext cx="2438400" cy="215444"/>
           </a:xfrm>
           <a:prstGeom prst="rect">
@@ -4351,7 +4334,7 @@
           <a:lstStyle/>
           <a:p>
             <a:r>
-              <a:rPr lang="en-US" sz="1400" dirty="0" smtClean="0">
+              <a:rPr lang="en-US" sz="1400" dirty="0">
                 <a:solidFill>
                   <a:schemeClr val="accent5">
                     <a:lumMod val="75000"/>
@@ -4361,17 +4344,17 @@
               <a:t>post(</a:t>
             </a:r>
             <a:r>
-              <a:rPr lang="en-US" sz="1400" dirty="0" err="1" smtClean="0">
+              <a:rPr lang="en-US" sz="1400" dirty="0" err="1">
                 <a:solidFill>
                   <a:schemeClr val="accent5">
                     <a:lumMod val="75000"/>
                   </a:schemeClr>
                 </a:solidFill>
               </a:rPr>
-              <a:t>AddressBookChangedEvent</a:t>
-            </a:r>
-            <a:r>
-              <a:rPr lang="en-US" sz="1400" dirty="0" smtClean="0">
+              <a:t>DiveLogChangedEvent</a:t>
+            </a:r>
+            <a:r>
+              <a:rPr lang="en-US" sz="1400" dirty="0">
                 <a:solidFill>
                   <a:schemeClr val="accent5">
                     <a:lumMod val="75000"/>
@@ -4380,13 +4363,6 @@
               </a:rPr>
               <a:t>)</a:t>
             </a:r>
-            <a:endParaRPr lang="en-US" sz="1400" dirty="0">
-              <a:solidFill>
-                <a:schemeClr val="accent5">
-                  <a:lumMod val="75000"/>
-                </a:schemeClr>
-              </a:solidFill>
-            </a:endParaRPr>
           </a:p>
         </p:txBody>
       </p:sp>
@@ -4552,7 +4528,7 @@
           <a:p>
             <a:pPr algn="ctr"/>
             <a:r>
-              <a:rPr lang="en-US" sz="1600" dirty="0" smtClean="0">
+              <a:rPr lang="en-US" sz="1600" dirty="0">
                 <a:solidFill>
                   <a:schemeClr val="bg1"/>
                 </a:solidFill>
@@ -4560,7 +4536,7 @@
               <a:t>:</a:t>
             </a:r>
             <a:r>
-              <a:rPr lang="en-US" sz="1600" dirty="0" err="1" smtClean="0">
+              <a:rPr lang="en-US" sz="1600" dirty="0" err="1">
                 <a:solidFill>
                   <a:schemeClr val="bg1"/>
                 </a:solidFill>
@@ -4793,7 +4769,7 @@
           <a:p>
             <a:pPr algn="ctr"/>
             <a:r>
-              <a:rPr lang="en-US" sz="1600" dirty="0" smtClean="0">
+              <a:rPr lang="en-US" sz="1600" dirty="0">
                 <a:solidFill>
                   <a:schemeClr val="bg1"/>
                 </a:solidFill>
@@ -4910,7 +4886,7 @@
         </p:nvSpPr>
         <p:spPr>
           <a:xfrm>
-            <a:off x="1810094" y="4797674"/>
+            <a:off x="1810094" y="4800600"/>
             <a:ext cx="2716635" cy="215444"/>
           </a:xfrm>
           <a:prstGeom prst="rect">
@@ -4925,7 +4901,7 @@
           <a:lstStyle/>
           <a:p>
             <a:r>
-              <a:rPr lang="en-US" sz="1400" dirty="0" smtClean="0">
+              <a:rPr lang="en-US" sz="1400" dirty="0">
                 <a:solidFill>
                   <a:schemeClr val="accent5">
                     <a:lumMod val="75000"/>
@@ -4935,17 +4911,17 @@
               <a:t>post(</a:t>
             </a:r>
             <a:r>
-              <a:rPr lang="en-US" sz="1400" dirty="0" err="1" smtClean="0">
+              <a:rPr lang="en-US" sz="1400" dirty="0" err="1">
                 <a:solidFill>
                   <a:schemeClr val="accent5">
                     <a:lumMod val="75000"/>
                   </a:schemeClr>
                 </a:solidFill>
               </a:rPr>
-              <a:t>AddressBookChangedEvent</a:t>
-            </a:r>
-            <a:r>
-              <a:rPr lang="en-US" sz="1400" dirty="0" smtClean="0">
+              <a:t>DiveLogChangedEvent</a:t>
+            </a:r>
+            <a:r>
+              <a:rPr lang="en-US" sz="1400" dirty="0">
                 <a:solidFill>
                   <a:schemeClr val="accent5">
                     <a:lumMod val="75000"/>
@@ -4954,13 +4930,6 @@
               </a:rPr>
               <a:t>)</a:t>
             </a:r>
-            <a:endParaRPr lang="en-US" sz="1400" dirty="0">
-              <a:solidFill>
-                <a:schemeClr val="accent5">
-                  <a:lumMod val="75000"/>
-                </a:schemeClr>
-              </a:solidFill>
-            </a:endParaRPr>
           </a:p>
         </p:txBody>
       </p:sp>
@@ -5052,7 +5021,7 @@
           <a:p>
             <a:pPr algn="ctr"/>
             <a:r>
-              <a:rPr lang="en-US" sz="1600" dirty="0" smtClean="0">
+              <a:rPr lang="en-US" sz="1600" dirty="0">
                 <a:solidFill>
                   <a:schemeClr val="bg1"/>
                 </a:solidFill>
@@ -5060,7 +5029,7 @@
               <a:t>:</a:t>
             </a:r>
             <a:r>
-              <a:rPr lang="en-US" sz="1600" dirty="0" err="1" smtClean="0">
+              <a:rPr lang="en-US" sz="1600" dirty="0" err="1">
                 <a:solidFill>
                   <a:schemeClr val="bg1"/>
                 </a:solidFill>
@@ -5307,17 +5276,17 @@
           <a:lstStyle/>
           <a:p>
             <a:r>
-              <a:rPr lang="en-US" sz="1400" dirty="0" err="1" smtClean="0">
+              <a:rPr lang="en-US" sz="1400" dirty="0" err="1">
                 <a:solidFill>
                   <a:schemeClr val="accent6">
                     <a:lumMod val="75000"/>
                   </a:schemeClr>
                 </a:solidFill>
               </a:rPr>
-              <a:t>handleAddresssBookChangedEvent</a:t>
-            </a:r>
-            <a:r>
-              <a:rPr lang="en-US" sz="1400" dirty="0" smtClean="0">
+              <a:t>handleDiveLogChangedEvent</a:t>
+            </a:r>
+            <a:r>
+              <a:rPr lang="en-US" sz="1400" dirty="0">
                 <a:solidFill>
                   <a:schemeClr val="accent6">
                     <a:lumMod val="75000"/>
@@ -5326,13 +5295,6 @@
               </a:rPr>
               <a:t>()</a:t>
             </a:r>
-            <a:endParaRPr lang="en-US" sz="1400" dirty="0">
-              <a:solidFill>
-                <a:schemeClr val="accent6">
-                  <a:lumMod val="75000"/>
-                </a:schemeClr>
-              </a:solidFill>
-            </a:endParaRPr>
           </a:p>
         </p:txBody>
       </p:sp>
@@ -5417,7 +5379,7 @@
           <a:p>
             <a:pPr algn="ctr"/>
             <a:r>
-              <a:rPr lang="en-US" sz="1600" dirty="0" smtClean="0">
+              <a:rPr lang="en-US" sz="1600" dirty="0">
                 <a:solidFill>
                   <a:schemeClr val="bg1"/>
                 </a:solidFill>
@@ -5620,26 +5582,21 @@
           <a:lstStyle/>
           <a:p>
             <a:r>
-              <a:rPr lang="en-US" sz="1400" dirty="0" err="1" smtClean="0">
+              <a:rPr lang="en-US" sz="1400" dirty="0" err="1">
                 <a:solidFill>
                   <a:srgbClr val="00B050"/>
                 </a:solidFill>
               </a:rPr>
-              <a:t>handleAddresssBookChangedEvent</a:t>
-            </a:r>
-            <a:r>
-              <a:rPr lang="en-US" sz="1400" dirty="0" smtClean="0">
+              <a:t>handleDiveLogChangedEvent</a:t>
+            </a:r>
+            <a:r>
+              <a:rPr lang="en-US" sz="1400" dirty="0">
                 <a:solidFill>
                   <a:srgbClr val="00B050"/>
                 </a:solidFill>
               </a:rPr>
               <a:t>()</a:t>
             </a:r>
-            <a:endParaRPr lang="en-US" sz="1400" dirty="0">
-              <a:solidFill>
-                <a:srgbClr val="00B050"/>
-              </a:solidFill>
-            </a:endParaRPr>
           </a:p>
         </p:txBody>
       </p:sp>
@@ -5826,18 +5783,13 @@
           <a:p>
             <a:pPr algn="r"/>
             <a:r>
-              <a:rPr lang="en-US" sz="1400" dirty="0" smtClean="0">
+              <a:rPr lang="en-US" sz="1400" dirty="0">
                 <a:solidFill>
                   <a:srgbClr val="00B050"/>
                 </a:solidFill>
               </a:rPr>
               <a:t>Update status bar</a:t>
             </a:r>
-            <a:endParaRPr lang="en-US" sz="1400" dirty="0">
-              <a:solidFill>
-                <a:srgbClr val="00B050"/>
-              </a:solidFill>
-            </a:endParaRPr>
           </a:p>
         </p:txBody>
       </p:sp>
@@ -6027,7 +5979,7 @@
           <a:lstStyle/>
           <a:p>
             <a:r>
-              <a:rPr lang="en-US" sz="1400" dirty="0" smtClean="0">
+              <a:rPr lang="en-US" sz="1400" dirty="0">
                 <a:solidFill>
                   <a:schemeClr val="accent6">
                     <a:lumMod val="75000"/>
@@ -6037,7 +5989,7 @@
               <a:t>Save </a:t>
             </a:r>
             <a:br>
-              <a:rPr lang="en-US" sz="1400" dirty="0" smtClean="0">
+              <a:rPr lang="en-US" sz="1400" dirty="0">
                 <a:solidFill>
                   <a:schemeClr val="accent6">
                     <a:lumMod val="75000"/>
@@ -6046,7 +5998,7 @@
               </a:rPr>
             </a:br>
             <a:r>
-              <a:rPr lang="en-US" sz="1400" dirty="0" smtClean="0">
+              <a:rPr lang="en-US" sz="1400" dirty="0">
                 <a:solidFill>
                   <a:schemeClr val="accent6">
                     <a:lumMod val="75000"/>
@@ -6055,13 +6007,6 @@
               </a:rPr>
               <a:t>to file</a:t>
             </a:r>
-            <a:endParaRPr lang="en-US" sz="1400" dirty="0">
-              <a:solidFill>
-                <a:schemeClr val="accent6">
-                  <a:lumMod val="75000"/>
-                </a:schemeClr>
-              </a:solidFill>
-            </a:endParaRPr>
           </a:p>
         </p:txBody>
       </p:sp>

</xml_diff>